<commit_message>
Add final presentation and documents
</commit_message>
<xml_diff>
--- a/BreakFirst - Rapport.pptx
+++ b/BreakFirst - Rapport.pptx
@@ -19479,11 +19479,7 @@
             </a:pPr>
             <a:r>
               <a:rPr lang="en" sz="1600" dirty="0" smtClean="0"/>
-              <a:t>Missions– </a:t>
-            </a:r>
-            <a:r>
-              <a:rPr lang="en" sz="1600" dirty="0" smtClean="0"/>
-              <a:t>KDv2 - Technique</a:t>
+              <a:t>Missions– KDv2 - Technique</a:t>
             </a:r>
             <a:endParaRPr lang="en" sz="1600" dirty="0"/>
           </a:p>
@@ -20315,11 +20311,7 @@
             </a:pPr>
             <a:r>
               <a:rPr lang="en" sz="1600" dirty="0" smtClean="0"/>
-              <a:t>Missions– </a:t>
-            </a:r>
-            <a:r>
-              <a:rPr lang="en" sz="1600" dirty="0" smtClean="0"/>
-              <a:t>KDv2 - Difficultés</a:t>
+              <a:t>Missions– KDv2 - Difficultés</a:t>
             </a:r>
             <a:endParaRPr lang="en" sz="1600" dirty="0"/>
           </a:p>
@@ -21259,11 +21251,7 @@
             </a:pPr>
             <a:r>
               <a:rPr lang="en" sz="1600" dirty="0" smtClean="0"/>
-              <a:t>Missions– </a:t>
-            </a:r>
-            <a:r>
-              <a:rPr lang="en" sz="1600" dirty="0" smtClean="0"/>
-              <a:t>KDv2 - Solutions</a:t>
+              <a:t>Missions– KDv2 - Solutions</a:t>
             </a:r>
             <a:endParaRPr lang="en" sz="1600" dirty="0"/>
           </a:p>
@@ -22905,11 +22893,7 @@
             </a:pPr>
             <a:r>
               <a:rPr lang="en" sz="1600" dirty="0" smtClean="0"/>
-              <a:t>Missions – </a:t>
-            </a:r>
-            <a:r>
-              <a:rPr lang="en" sz="1600" dirty="0" smtClean="0"/>
-              <a:t>KDv1 - Organisation </a:t>
+              <a:t>Missions – KDv1 - Organisation </a:t>
             </a:r>
             <a:endParaRPr lang="en" sz="1600" dirty="0"/>
           </a:p>
@@ -24204,11 +24188,7 @@
             </a:pPr>
             <a:r>
               <a:rPr lang="en" sz="1600" dirty="0" smtClean="0"/>
-              <a:t>Missions – </a:t>
-            </a:r>
-            <a:r>
-              <a:rPr lang="en" sz="1600" dirty="0" smtClean="0"/>
-              <a:t>KDv1 - Organisation </a:t>
+              <a:t>Missions – KDv1 - Organisation </a:t>
             </a:r>
             <a:endParaRPr lang="en" sz="1600" dirty="0"/>
           </a:p>
@@ -24765,11 +24745,7 @@
             </a:pPr>
             <a:r>
               <a:rPr lang="en" sz="1600" dirty="0" smtClean="0"/>
-              <a:t>Missions – </a:t>
-            </a:r>
-            <a:r>
-              <a:rPr lang="en" sz="1600" dirty="0" smtClean="0"/>
-              <a:t>KDv1 - Organisation </a:t>
+              <a:t>Missions – KDv1 - Organisation </a:t>
             </a:r>
             <a:endParaRPr lang="en" sz="1600" dirty="0"/>
           </a:p>
@@ -25330,11 +25306,7 @@
             </a:pPr>
             <a:r>
               <a:rPr lang="en" sz="1600" dirty="0" smtClean="0"/>
-              <a:t>Missions – </a:t>
-            </a:r>
-            <a:r>
-              <a:rPr lang="en" sz="1600" dirty="0" smtClean="0"/>
-              <a:t>KDv1 - Organisation </a:t>
+              <a:t>Missions – KDv1 - Organisation </a:t>
             </a:r>
             <a:endParaRPr lang="en" sz="1600" dirty="0"/>
           </a:p>
@@ -25694,21 +25666,7 @@
                 <a:ea typeface="+mn-ea"/>
                 <a:cs typeface="+mn-cs"/>
               </a:rPr>
-              <a:t>oncentration </a:t>
-            </a:r>
-            <a:r>
-              <a:rPr lang="en" sz="2000" kern="1200" dirty="0" smtClean="0">
-                <a:solidFill>
-                  <a:schemeClr val="tx1">
-                    <a:lumMod val="50000"/>
-                    <a:lumOff val="50000"/>
-                  </a:schemeClr>
-                </a:solidFill>
-                <a:latin typeface="+mj-lt"/>
-                <a:ea typeface="+mn-ea"/>
-                <a:cs typeface="+mn-cs"/>
-              </a:rPr>
-              <a:t>sur un seul projet</a:t>
+              <a:t>oncentration sur un seul projet</a:t>
             </a:r>
             <a:endParaRPr lang="en" sz="2000" kern="1200" dirty="0">
               <a:solidFill>
@@ -27722,7 +27680,21 @@
                 <a:ea typeface="+mn-ea"/>
                 <a:cs typeface="+mn-cs"/>
               </a:rPr>
-              <a:t>éaction correcte</a:t>
+              <a:t>éaction </a:t>
+            </a:r>
+            <a:r>
+              <a:rPr lang="en" sz="2400" kern="1200" dirty="0" smtClean="0">
+                <a:solidFill>
+                  <a:schemeClr val="tx1">
+                    <a:lumMod val="50000"/>
+                    <a:lumOff val="50000"/>
+                  </a:schemeClr>
+                </a:solidFill>
+                <a:latin typeface="+mj-lt"/>
+                <a:ea typeface="+mn-ea"/>
+                <a:cs typeface="+mn-cs"/>
+              </a:rPr>
+              <a:t>adaptée</a:t>
             </a:r>
             <a:endParaRPr lang="en" sz="2400" kern="1200" dirty="0">
               <a:solidFill>
@@ -29882,11 +29854,7 @@
             </a:pPr>
             <a:r>
               <a:rPr lang="fr-FR" dirty="0" smtClean="0"/>
-              <a:t>Un </a:t>
-            </a:r>
-            <a:r>
-              <a:rPr lang="fr-FR" dirty="0" smtClean="0"/>
-              <a:t>inconnu</a:t>
+              <a:t>Un inconnu</a:t>
             </a:r>
             <a:endParaRPr dirty="0"/>
           </a:p>
@@ -32107,7 +32075,6 @@
               <a:rPr lang="en" sz="1600" dirty="0"/>
               <a:t>BreakFirst</a:t>
             </a:r>
-            <a:endParaRPr lang="en" sz="1600" dirty="0"/>
           </a:p>
         </p:txBody>
       </p:sp>
@@ -32599,7 +32566,6 @@
               <a:rPr lang="en" sz="1600" dirty="0"/>
               <a:t>BreakFirst</a:t>
             </a:r>
-            <a:endParaRPr lang="en" sz="1600" dirty="0"/>
           </a:p>
         </p:txBody>
       </p:sp>

</xml_diff>